<commit_message>
night algo and virtual sensor
</commit_message>
<xml_diff>
--- a/projects/img_articles_portfolio.pptx
+++ b/projects/img_articles_portfolio.pptx
@@ -5,9 +5,7 @@
     <p:sldMasterId id="2147483684" r:id="rId1"/>
   </p:sldMasterIdLst>
   <p:sldIdLst>
-    <p:sldId id="256" r:id="rId2"/>
-    <p:sldId id="257" r:id="rId3"/>
-    <p:sldId id="259" r:id="rId4"/>
+    <p:sldId id="260" r:id="rId2"/>
   </p:sldIdLst>
   <p:sldSz cx="10799763" cy="10799763"/>
   <p:notesSz cx="6858000" cy="9144000"/>
@@ -2971,7 +2969,13 @@
     </p:bg>
     <p:spTree>
       <p:nvGrpSpPr>
-        <p:cNvPr id="1" name=""/>
+        <p:cNvPr id="1" name="">
+          <a:extLst>
+            <a:ext uri="{FF2B5EF4-FFF2-40B4-BE49-F238E27FC236}">
+              <a16:creationId xmlns:a16="http://schemas.microsoft.com/office/drawing/2014/main" id="{3B0198AD-AFC4-628A-B2C7-177B3914818C}"/>
+            </a:ext>
+          </a:extLst>
+        </p:cNvPr>
         <p:cNvGrpSpPr/>
         <p:nvPr/>
       </p:nvGrpSpPr>
@@ -2985,10 +2989,10 @@
       </p:grpSpPr>
       <p:pic>
         <p:nvPicPr>
-          <p:cNvPr id="3" name="Image 2" descr="Une image contenant capture d’écran, carré, Rectangle, diagramme&#10;&#10;Description générée automatiquement">
+          <p:cNvPr id="9" name="Image 8" descr="Une image contenant cockpit, panneau de contrôle, Instruments de vol, véhicule&#10;&#10;Description générée automatiquement">
             <a:extLst>
               <a:ext uri="{FF2B5EF4-FFF2-40B4-BE49-F238E27FC236}">
-                <a16:creationId xmlns:a16="http://schemas.microsoft.com/office/drawing/2014/main" id="{27E8BCF2-7219-E3F1-2C83-12A730EFE0DE}"/>
+                <a16:creationId xmlns:a16="http://schemas.microsoft.com/office/drawing/2014/main" id="{C55F7972-15F8-4268-6F78-D42877CB59DA}"/>
               </a:ext>
             </a:extLst>
           </p:cNvPr>
@@ -3005,8 +3009,8 @@
         </p:blipFill>
         <p:spPr>
           <a:xfrm>
-            <a:off x="-1" y="1896764"/>
-            <a:ext cx="10799763" cy="7006233"/>
+            <a:off x="0" y="1529966"/>
+            <a:ext cx="10799763" cy="7739829"/>
           </a:xfrm>
           <a:prstGeom prst="rect">
             <a:avLst/>
@@ -3016,155 +3020,7 @@
     </p:spTree>
     <p:extLst>
       <p:ext uri="{BB962C8B-B14F-4D97-AF65-F5344CB8AC3E}">
-        <p14:creationId xmlns:p14="http://schemas.microsoft.com/office/powerpoint/2010/main" val="2216925610"/>
-      </p:ext>
-    </p:extLst>
-  </p:cSld>
-  <p:clrMapOvr>
-    <a:masterClrMapping/>
-  </p:clrMapOvr>
-</p:sld>
-</file>
-
-<file path=ppt/slides/slide2.xml><?xml version="1.0" encoding="utf-8"?>
-<p:sld xmlns:a="http://schemas.openxmlformats.org/drawingml/2006/main" xmlns:r="http://schemas.openxmlformats.org/officeDocument/2006/relationships" xmlns:p="http://schemas.openxmlformats.org/presentationml/2006/main">
-  <p:cSld>
-    <p:bg>
-      <p:bgPr>
-        <a:solidFill>
-          <a:schemeClr val="bg1"/>
-        </a:solidFill>
-        <a:effectLst/>
-      </p:bgPr>
-    </p:bg>
-    <p:spTree>
-      <p:nvGrpSpPr>
-        <p:cNvPr id="1" name="">
-          <a:extLst>
-            <a:ext uri="{FF2B5EF4-FFF2-40B4-BE49-F238E27FC236}">
-              <a16:creationId xmlns:a16="http://schemas.microsoft.com/office/drawing/2014/main" id="{A66BCFBC-9776-B50E-0618-95F3963D58BB}"/>
-            </a:ext>
-          </a:extLst>
-        </p:cNvPr>
-        <p:cNvGrpSpPr/>
-        <p:nvPr/>
-      </p:nvGrpSpPr>
-      <p:grpSpPr>
-        <a:xfrm>
-          <a:off x="0" y="0"/>
-          <a:ext cx="0" cy="0"/>
-          <a:chOff x="0" y="0"/>
-          <a:chExt cx="0" cy="0"/>
-        </a:xfrm>
-      </p:grpSpPr>
-      <p:pic>
-        <p:nvPicPr>
-          <p:cNvPr id="7" name="Image 6" descr="Une image contenant texte, capture d’écran, conception&#10;&#10;Description générée automatiquement">
-            <a:extLst>
-              <a:ext uri="{FF2B5EF4-FFF2-40B4-BE49-F238E27FC236}">
-                <a16:creationId xmlns:a16="http://schemas.microsoft.com/office/drawing/2014/main" id="{EA69A589-5556-C359-D3E0-1887D283A270}"/>
-              </a:ext>
-            </a:extLst>
-          </p:cNvPr>
-          <p:cNvPicPr>
-            <a:picLocks noChangeAspect="1"/>
-          </p:cNvPicPr>
-          <p:nvPr/>
-        </p:nvPicPr>
-        <p:blipFill>
-          <a:blip r:embed="rId2"/>
-          <a:stretch>
-            <a:fillRect/>
-          </a:stretch>
-        </p:blipFill>
-        <p:spPr>
-          <a:xfrm>
-            <a:off x="192925" y="90841"/>
-            <a:ext cx="10413911" cy="10708922"/>
-          </a:xfrm>
-          <a:prstGeom prst="rect">
-            <a:avLst/>
-          </a:prstGeom>
-        </p:spPr>
-      </p:pic>
-    </p:spTree>
-    <p:extLst>
-      <p:ext uri="{BB962C8B-B14F-4D97-AF65-F5344CB8AC3E}">
-        <p14:creationId xmlns:p14="http://schemas.microsoft.com/office/powerpoint/2010/main" val="2638382871"/>
-      </p:ext>
-    </p:extLst>
-  </p:cSld>
-  <p:clrMapOvr>
-    <a:masterClrMapping/>
-  </p:clrMapOvr>
-</p:sld>
-</file>
-
-<file path=ppt/slides/slide3.xml><?xml version="1.0" encoding="utf-8"?>
-<p:sld xmlns:a="http://schemas.openxmlformats.org/drawingml/2006/main" xmlns:r="http://schemas.openxmlformats.org/officeDocument/2006/relationships" xmlns:p="http://schemas.openxmlformats.org/presentationml/2006/main">
-  <p:cSld>
-    <p:bg>
-      <p:bgPr>
-        <a:solidFill>
-          <a:srgbClr val="000000"/>
-        </a:solidFill>
-        <a:effectLst/>
-      </p:bgPr>
-    </p:bg>
-    <p:spTree>
-      <p:nvGrpSpPr>
-        <p:cNvPr id="1" name="">
-          <a:extLst>
-            <a:ext uri="{FF2B5EF4-FFF2-40B4-BE49-F238E27FC236}">
-              <a16:creationId xmlns:a16="http://schemas.microsoft.com/office/drawing/2014/main" id="{97D26FCD-EE95-2ABD-1481-2A509909B134}"/>
-            </a:ext>
-          </a:extLst>
-        </p:cNvPr>
-        <p:cNvGrpSpPr/>
-        <p:nvPr/>
-      </p:nvGrpSpPr>
-      <p:grpSpPr>
-        <a:xfrm>
-          <a:off x="0" y="0"/>
-          <a:ext cx="0" cy="0"/>
-          <a:chOff x="0" y="0"/>
-          <a:chExt cx="0" cy="0"/>
-        </a:xfrm>
-      </p:grpSpPr>
-      <p:pic>
-        <p:nvPicPr>
-          <p:cNvPr id="5" name="Image 4" descr="Une image contenant diagramme, ligne, dessin, croquis&#10;&#10;Description générée automatiquement">
-            <a:extLst>
-              <a:ext uri="{FF2B5EF4-FFF2-40B4-BE49-F238E27FC236}">
-                <a16:creationId xmlns:a16="http://schemas.microsoft.com/office/drawing/2014/main" id="{1D98FD9C-71AD-BBF1-2E3D-0AC7C3364340}"/>
-              </a:ext>
-            </a:extLst>
-          </p:cNvPr>
-          <p:cNvPicPr>
-            <a:picLocks noChangeAspect="1"/>
-          </p:cNvPicPr>
-          <p:nvPr/>
-        </p:nvPicPr>
-        <p:blipFill>
-          <a:blip r:embed="rId2"/>
-          <a:stretch>
-            <a:fillRect/>
-          </a:stretch>
-        </p:blipFill>
-        <p:spPr>
-          <a:xfrm>
-            <a:off x="309135" y="118381"/>
-            <a:ext cx="10181492" cy="10563000"/>
-          </a:xfrm>
-          <a:prstGeom prst="rect">
-            <a:avLst/>
-          </a:prstGeom>
-        </p:spPr>
-      </p:pic>
-    </p:spTree>
-    <p:extLst>
-      <p:ext uri="{BB962C8B-B14F-4D97-AF65-F5344CB8AC3E}">
-        <p14:creationId xmlns:p14="http://schemas.microsoft.com/office/powerpoint/2010/main" val="563724430"/>
+        <p14:creationId xmlns:p14="http://schemas.microsoft.com/office/powerpoint/2010/main" val="3983980570"/>
       </p:ext>
     </p:extLst>
   </p:cSld>

</xml_diff>

<commit_message>
new images green ia
</commit_message>
<xml_diff>
--- a/projects/img_articles_portfolio.pptx
+++ b/projects/img_articles_portfolio.pptx
@@ -6,6 +6,8 @@
   </p:sldMasterIdLst>
   <p:sldIdLst>
     <p:sldId id="260" r:id="rId2"/>
+    <p:sldId id="261" r:id="rId3"/>
+    <p:sldId id="262" r:id="rId4"/>
   </p:sldIdLst>
   <p:sldSz cx="10799763" cy="10799763"/>
   <p:notesSz cx="6858000" cy="9144000"/>
@@ -2989,10 +2991,10 @@
       </p:grpSpPr>
       <p:pic>
         <p:nvPicPr>
-          <p:cNvPr id="11" name="Image 10" descr="Une image contenant transport, avion, véhicule, Transport aérien&#10;&#10;Description générée automatiquement">
+          <p:cNvPr id="13" name="Image 12" descr="Une image contenant texte, capture d’écran, logo&#10;&#10;Description générée automatiquement">
             <a:extLst>
               <a:ext uri="{FF2B5EF4-FFF2-40B4-BE49-F238E27FC236}">
-                <a16:creationId xmlns:a16="http://schemas.microsoft.com/office/drawing/2014/main" id="{7FF4AE0F-FC0A-3497-6FE0-815E94342C81}"/>
+                <a16:creationId xmlns:a16="http://schemas.microsoft.com/office/drawing/2014/main" id="{091984B3-D43A-4ED1-6F2C-8633068E1E96}"/>
               </a:ext>
             </a:extLst>
           </p:cNvPr>
@@ -3003,13 +3005,14 @@
         </p:nvPicPr>
         <p:blipFill>
           <a:blip r:embed="rId2"/>
-          <a:srcRect l="8554" r="17451"/>
-          <a:stretch/>
+          <a:stretch>
+            <a:fillRect/>
+          </a:stretch>
         </p:blipFill>
         <p:spPr>
           <a:xfrm>
-            <a:off x="-1" y="534804"/>
-            <a:ext cx="10799763" cy="9730154"/>
+            <a:off x="2287348" y="-1"/>
+            <a:ext cx="6225065" cy="10799764"/>
           </a:xfrm>
           <a:prstGeom prst="rect">
             <a:avLst/>
@@ -3020,6 +3023,154 @@
     <p:extLst>
       <p:ext uri="{BB962C8B-B14F-4D97-AF65-F5344CB8AC3E}">
         <p14:creationId xmlns:p14="http://schemas.microsoft.com/office/powerpoint/2010/main" val="3983980570"/>
+      </p:ext>
+    </p:extLst>
+  </p:cSld>
+  <p:clrMapOvr>
+    <a:masterClrMapping/>
+  </p:clrMapOvr>
+</p:sld>
+</file>
+
+<file path=ppt/slides/slide2.xml><?xml version="1.0" encoding="utf-8"?>
+<p:sld xmlns:a="http://schemas.openxmlformats.org/drawingml/2006/main" xmlns:r="http://schemas.openxmlformats.org/officeDocument/2006/relationships" xmlns:p="http://schemas.openxmlformats.org/presentationml/2006/main">
+  <p:cSld>
+    <p:bg>
+      <p:bgPr>
+        <a:solidFill>
+          <a:srgbClr val="000000"/>
+        </a:solidFill>
+        <a:effectLst/>
+      </p:bgPr>
+    </p:bg>
+    <p:spTree>
+      <p:nvGrpSpPr>
+        <p:cNvPr id="1" name="">
+          <a:extLst>
+            <a:ext uri="{FF2B5EF4-FFF2-40B4-BE49-F238E27FC236}">
+              <a16:creationId xmlns:a16="http://schemas.microsoft.com/office/drawing/2014/main" id="{9A28C23E-05E4-FF37-B4C9-A7E799CA7B61}"/>
+            </a:ext>
+          </a:extLst>
+        </p:cNvPr>
+        <p:cNvGrpSpPr/>
+        <p:nvPr/>
+      </p:nvGrpSpPr>
+      <p:grpSpPr>
+        <a:xfrm>
+          <a:off x="0" y="0"/>
+          <a:ext cx="0" cy="0"/>
+          <a:chOff x="0" y="0"/>
+          <a:chExt cx="0" cy="0"/>
+        </a:xfrm>
+      </p:grpSpPr>
+      <p:pic>
+        <p:nvPicPr>
+          <p:cNvPr id="2" name="Image 1" descr="Une image contenant texte, capture d’écran, Police, nombre&#10;&#10;Description générée automatiquement">
+            <a:extLst>
+              <a:ext uri="{FF2B5EF4-FFF2-40B4-BE49-F238E27FC236}">
+                <a16:creationId xmlns:a16="http://schemas.microsoft.com/office/drawing/2014/main" id="{BB93FC55-A33C-2AF9-1434-FA82C222B806}"/>
+              </a:ext>
+            </a:extLst>
+          </p:cNvPr>
+          <p:cNvPicPr>
+            <a:picLocks noChangeAspect="1"/>
+          </p:cNvPicPr>
+          <p:nvPr/>
+        </p:nvPicPr>
+        <p:blipFill>
+          <a:blip r:embed="rId2"/>
+          <a:stretch>
+            <a:fillRect/>
+          </a:stretch>
+        </p:blipFill>
+        <p:spPr>
+          <a:xfrm>
+            <a:off x="2278981" y="0"/>
+            <a:ext cx="6241799" cy="10799763"/>
+          </a:xfrm>
+          <a:prstGeom prst="rect">
+            <a:avLst/>
+          </a:prstGeom>
+        </p:spPr>
+      </p:pic>
+    </p:spTree>
+    <p:extLst>
+      <p:ext uri="{BB962C8B-B14F-4D97-AF65-F5344CB8AC3E}">
+        <p14:creationId xmlns:p14="http://schemas.microsoft.com/office/powerpoint/2010/main" val="1299833594"/>
+      </p:ext>
+    </p:extLst>
+  </p:cSld>
+  <p:clrMapOvr>
+    <a:masterClrMapping/>
+  </p:clrMapOvr>
+</p:sld>
+</file>
+
+<file path=ppt/slides/slide3.xml><?xml version="1.0" encoding="utf-8"?>
+<p:sld xmlns:a="http://schemas.openxmlformats.org/drawingml/2006/main" xmlns:r="http://schemas.openxmlformats.org/officeDocument/2006/relationships" xmlns:p="http://schemas.openxmlformats.org/presentationml/2006/main">
+  <p:cSld>
+    <p:bg>
+      <p:bgPr>
+        <a:solidFill>
+          <a:srgbClr val="000000"/>
+        </a:solidFill>
+        <a:effectLst/>
+      </p:bgPr>
+    </p:bg>
+    <p:spTree>
+      <p:nvGrpSpPr>
+        <p:cNvPr id="1" name="">
+          <a:extLst>
+            <a:ext uri="{FF2B5EF4-FFF2-40B4-BE49-F238E27FC236}">
+              <a16:creationId xmlns:a16="http://schemas.microsoft.com/office/drawing/2014/main" id="{7A84B867-EFE4-5FE6-4CD4-FCA6142E36FA}"/>
+            </a:ext>
+          </a:extLst>
+        </p:cNvPr>
+        <p:cNvGrpSpPr/>
+        <p:nvPr/>
+      </p:nvGrpSpPr>
+      <p:grpSpPr>
+        <a:xfrm>
+          <a:off x="0" y="0"/>
+          <a:ext cx="0" cy="0"/>
+          <a:chOff x="0" y="0"/>
+          <a:chExt cx="0" cy="0"/>
+        </a:xfrm>
+      </p:grpSpPr>
+      <p:pic>
+        <p:nvPicPr>
+          <p:cNvPr id="2" name="Image 1" descr="Une image contenant texte, capture d’écran, diagramme, Police&#10;&#10;Description générée automatiquement">
+            <a:extLst>
+              <a:ext uri="{FF2B5EF4-FFF2-40B4-BE49-F238E27FC236}">
+                <a16:creationId xmlns:a16="http://schemas.microsoft.com/office/drawing/2014/main" id="{54FFBA0E-34FC-6F5C-EB6D-17AC6FB27276}"/>
+              </a:ext>
+            </a:extLst>
+          </p:cNvPr>
+          <p:cNvPicPr>
+            <a:picLocks noChangeAspect="1"/>
+          </p:cNvPicPr>
+          <p:nvPr/>
+        </p:nvPicPr>
+        <p:blipFill>
+          <a:blip r:embed="rId2"/>
+          <a:stretch>
+            <a:fillRect/>
+          </a:stretch>
+        </p:blipFill>
+        <p:spPr>
+          <a:xfrm>
+            <a:off x="2279064" y="0"/>
+            <a:ext cx="6241633" cy="10794639"/>
+          </a:xfrm>
+          <a:prstGeom prst="rect">
+            <a:avLst/>
+          </a:prstGeom>
+        </p:spPr>
+      </p:pic>
+    </p:spTree>
+    <p:extLst>
+      <p:ext uri="{BB962C8B-B14F-4D97-AF65-F5344CB8AC3E}">
+        <p14:creationId xmlns:p14="http://schemas.microsoft.com/office/powerpoint/2010/main" val="497787145"/>
       </p:ext>
     </p:extLst>
   </p:cSld>

</xml_diff>